<commit_message>
Avance en la maqueta, añadidas dos diapositivas
</commit_message>
<xml_diff>
--- a/MAQUETA.pptx
+++ b/MAQUETA.pptx
@@ -8,7 +8,7 @@
     <p:sldId id="256" r:id="rId2"/>
     <p:sldId id="264" r:id="rId3"/>
     <p:sldId id="260" r:id="rId4"/>
-    <p:sldId id="261" r:id="rId5"/>
+    <p:sldId id="265" r:id="rId5"/>
     <p:sldId id="262" r:id="rId6"/>
     <p:sldId id="263" r:id="rId7"/>
     <p:sldId id="257" r:id="rId8"/>
@@ -303,6 +303,18 @@
   <p:clrMapOvr>
     <a:masterClrMapping/>
   </p:clrMapOvr>
+  <mc:AlternateContent xmlns:mc="http://schemas.openxmlformats.org/markup-compatibility/2006">
+    <mc:Choice xmlns:p14="http://schemas.microsoft.com/office/powerpoint/2010/main" Requires="p14">
+      <p:transition spd="med" p14:dur="700">
+        <p:fade/>
+      </p:transition>
+    </mc:Choice>
+    <mc:Fallback>
+      <p:transition spd="med">
+        <p:fade/>
+      </p:transition>
+    </mc:Fallback>
+  </mc:AlternateContent>
 </p:sldLayout>
 </file>
 
@@ -473,6 +485,18 @@
   <p:clrMapOvr>
     <a:masterClrMapping/>
   </p:clrMapOvr>
+  <mc:AlternateContent xmlns:mc="http://schemas.openxmlformats.org/markup-compatibility/2006">
+    <mc:Choice xmlns:p14="http://schemas.microsoft.com/office/powerpoint/2010/main" Requires="p14">
+      <p:transition spd="med" p14:dur="700">
+        <p:fade/>
+      </p:transition>
+    </mc:Choice>
+    <mc:Fallback>
+      <p:transition spd="med">
+        <p:fade/>
+      </p:transition>
+    </mc:Fallback>
+  </mc:AlternateContent>
 </p:sldLayout>
 </file>
 
@@ -653,6 +677,18 @@
   <p:clrMapOvr>
     <a:masterClrMapping/>
   </p:clrMapOvr>
+  <mc:AlternateContent xmlns:mc="http://schemas.openxmlformats.org/markup-compatibility/2006">
+    <mc:Choice xmlns:p14="http://schemas.microsoft.com/office/powerpoint/2010/main" Requires="p14">
+      <p:transition spd="med" p14:dur="700">
+        <p:fade/>
+      </p:transition>
+    </mc:Choice>
+    <mc:Fallback>
+      <p:transition spd="med">
+        <p:fade/>
+      </p:transition>
+    </mc:Fallback>
+  </mc:AlternateContent>
 </p:sldLayout>
 </file>
 
@@ -823,6 +859,18 @@
   <p:clrMapOvr>
     <a:masterClrMapping/>
   </p:clrMapOvr>
+  <mc:AlternateContent xmlns:mc="http://schemas.openxmlformats.org/markup-compatibility/2006">
+    <mc:Choice xmlns:p14="http://schemas.microsoft.com/office/powerpoint/2010/main" Requires="p14">
+      <p:transition spd="med" p14:dur="700">
+        <p:fade/>
+      </p:transition>
+    </mc:Choice>
+    <mc:Fallback>
+      <p:transition spd="med">
+        <p:fade/>
+      </p:transition>
+    </mc:Fallback>
+  </mc:AlternateContent>
 </p:sldLayout>
 </file>
 
@@ -1069,6 +1117,18 @@
   <p:clrMapOvr>
     <a:masterClrMapping/>
   </p:clrMapOvr>
+  <mc:AlternateContent xmlns:mc="http://schemas.openxmlformats.org/markup-compatibility/2006">
+    <mc:Choice xmlns:p14="http://schemas.microsoft.com/office/powerpoint/2010/main" Requires="p14">
+      <p:transition spd="med" p14:dur="700">
+        <p:fade/>
+      </p:transition>
+    </mc:Choice>
+    <mc:Fallback>
+      <p:transition spd="med">
+        <p:fade/>
+      </p:transition>
+    </mc:Fallback>
+  </mc:AlternateContent>
 </p:sldLayout>
 </file>
 
@@ -1301,6 +1361,18 @@
   <p:clrMapOvr>
     <a:masterClrMapping/>
   </p:clrMapOvr>
+  <mc:AlternateContent xmlns:mc="http://schemas.openxmlformats.org/markup-compatibility/2006">
+    <mc:Choice xmlns:p14="http://schemas.microsoft.com/office/powerpoint/2010/main" Requires="p14">
+      <p:transition spd="med" p14:dur="700">
+        <p:fade/>
+      </p:transition>
+    </mc:Choice>
+    <mc:Fallback>
+      <p:transition spd="med">
+        <p:fade/>
+      </p:transition>
+    </mc:Fallback>
+  </mc:AlternateContent>
 </p:sldLayout>
 </file>
 
@@ -1668,6 +1740,18 @@
   <p:clrMapOvr>
     <a:masterClrMapping/>
   </p:clrMapOvr>
+  <mc:AlternateContent xmlns:mc="http://schemas.openxmlformats.org/markup-compatibility/2006">
+    <mc:Choice xmlns:p14="http://schemas.microsoft.com/office/powerpoint/2010/main" Requires="p14">
+      <p:transition spd="med" p14:dur="700">
+        <p:fade/>
+      </p:transition>
+    </mc:Choice>
+    <mc:Fallback>
+      <p:transition spd="med">
+        <p:fade/>
+      </p:transition>
+    </mc:Fallback>
+  </mc:AlternateContent>
 </p:sldLayout>
 </file>
 
@@ -1786,6 +1870,18 @@
   <p:clrMapOvr>
     <a:masterClrMapping/>
   </p:clrMapOvr>
+  <mc:AlternateContent xmlns:mc="http://schemas.openxmlformats.org/markup-compatibility/2006">
+    <mc:Choice xmlns:p14="http://schemas.microsoft.com/office/powerpoint/2010/main" Requires="p14">
+      <p:transition spd="med" p14:dur="700">
+        <p:fade/>
+      </p:transition>
+    </mc:Choice>
+    <mc:Fallback>
+      <p:transition spd="med">
+        <p:fade/>
+      </p:transition>
+    </mc:Fallback>
+  </mc:AlternateContent>
 </p:sldLayout>
 </file>
 
@@ -1881,6 +1977,18 @@
   <p:clrMapOvr>
     <a:masterClrMapping/>
   </p:clrMapOvr>
+  <mc:AlternateContent xmlns:mc="http://schemas.openxmlformats.org/markup-compatibility/2006">
+    <mc:Choice xmlns:p14="http://schemas.microsoft.com/office/powerpoint/2010/main" Requires="p14">
+      <p:transition spd="med" p14:dur="700">
+        <p:fade/>
+      </p:transition>
+    </mc:Choice>
+    <mc:Fallback>
+      <p:transition spd="med">
+        <p:fade/>
+      </p:transition>
+    </mc:Fallback>
+  </mc:AlternateContent>
 </p:sldLayout>
 </file>
 
@@ -2158,6 +2266,18 @@
   <p:clrMapOvr>
     <a:masterClrMapping/>
   </p:clrMapOvr>
+  <mc:AlternateContent xmlns:mc="http://schemas.openxmlformats.org/markup-compatibility/2006">
+    <mc:Choice xmlns:p14="http://schemas.microsoft.com/office/powerpoint/2010/main" Requires="p14">
+      <p:transition spd="med" p14:dur="700">
+        <p:fade/>
+      </p:transition>
+    </mc:Choice>
+    <mc:Fallback>
+      <p:transition spd="med">
+        <p:fade/>
+      </p:transition>
+    </mc:Fallback>
+  </mc:AlternateContent>
 </p:sldLayout>
 </file>
 
@@ -2411,6 +2531,18 @@
   <p:clrMapOvr>
     <a:masterClrMapping/>
   </p:clrMapOvr>
+  <mc:AlternateContent xmlns:mc="http://schemas.openxmlformats.org/markup-compatibility/2006">
+    <mc:Choice xmlns:p14="http://schemas.microsoft.com/office/powerpoint/2010/main" Requires="p14">
+      <p:transition spd="med" p14:dur="700">
+        <p:fade/>
+      </p:transition>
+    </mc:Choice>
+    <mc:Fallback>
+      <p:transition spd="med">
+        <p:fade/>
+      </p:transition>
+    </mc:Fallback>
+  </mc:AlternateContent>
 </p:sldLayout>
 </file>
 
@@ -2671,6 +2803,18 @@
     <p:sldLayoutId id="2147483658" r:id="rId10"/>
     <p:sldLayoutId id="2147483659" r:id="rId11"/>
   </p:sldLayoutIdLst>
+  <mc:AlternateContent xmlns:mc="http://schemas.openxmlformats.org/markup-compatibility/2006">
+    <mc:Choice xmlns:p14="http://schemas.microsoft.com/office/powerpoint/2010/main" Requires="p14">
+      <p:transition spd="med" p14:dur="700">
+        <p:fade/>
+      </p:transition>
+    </mc:Choice>
+    <mc:Fallback>
+      <p:transition spd="med">
+        <p:fade/>
+      </p:transition>
+    </mc:Fallback>
+  </mc:AlternateContent>
   <p:txStyles>
     <p:titleStyle>
       <a:lvl1pPr algn="l" defTabSz="914400" rtl="0" eaLnBrk="1" latinLnBrk="0" hangingPunct="1">
@@ -3778,6 +3922,18 @@
   <p:clrMapOvr>
     <a:masterClrMapping/>
   </p:clrMapOvr>
+  <mc:AlternateContent xmlns:mc="http://schemas.openxmlformats.org/markup-compatibility/2006">
+    <mc:Choice xmlns:p14="http://schemas.microsoft.com/office/powerpoint/2010/main" Requires="p14">
+      <p:transition spd="med" p14:dur="700">
+        <p:fade/>
+      </p:transition>
+    </mc:Choice>
+    <mc:Fallback>
+      <p:transition spd="med">
+        <p:fade/>
+      </p:transition>
+    </mc:Fallback>
+  </mc:AlternateContent>
   <p:timing>
     <p:tnLst>
       <p:par>
@@ -4497,6 +4653,18 @@
   <p:clrMapOvr>
     <a:masterClrMapping/>
   </p:clrMapOvr>
+  <mc:AlternateContent xmlns:mc="http://schemas.openxmlformats.org/markup-compatibility/2006">
+    <mc:Choice xmlns:p14="http://schemas.microsoft.com/office/powerpoint/2010/main" Requires="p14">
+      <p:transition spd="med" p14:dur="700">
+        <p:fade/>
+      </p:transition>
+    </mc:Choice>
+    <mc:Fallback>
+      <p:transition spd="med">
+        <p:fade/>
+      </p:transition>
+    </mc:Fallback>
+  </mc:AlternateContent>
   <p:timing>
     <p:tnLst>
       <p:par>
@@ -5599,7 +5767,7 @@
           <p:nvPr/>
         </p:nvPicPr>
         <p:blipFill>
-          <a:blip r:embed="rId2">
+          <a:blip r:embed="rId3">
             <a:extLst>
               <a:ext uri="{28A0092B-C50C-407E-A947-70E740481C1C}">
                 <a14:useLocalDpi xmlns:a14="http://schemas.microsoft.com/office/drawing/2010/main" val="0"/>
@@ -6559,7 +6727,6 @@
               <a:rPr lang="es-ES" dirty="0"/>
               <a:t>L</a:t>
             </a:r>
-            <a:endParaRPr lang="es-ES" dirty="0"/>
           </a:p>
         </p:txBody>
       </p:sp>
@@ -6589,7 +6756,6 @@
               <a:rPr lang="es-ES" dirty="0"/>
               <a:t>M</a:t>
             </a:r>
-            <a:endParaRPr lang="es-ES" dirty="0"/>
           </a:p>
         </p:txBody>
       </p:sp>
@@ -6723,6 +6889,18 @@
   <p:clrMapOvr>
     <a:masterClrMapping/>
   </p:clrMapOvr>
+  <mc:AlternateContent xmlns:mc="http://schemas.openxmlformats.org/markup-compatibility/2006">
+    <mc:Choice xmlns:p14="http://schemas.microsoft.com/office/powerpoint/2010/main" Requires="p14">
+      <p:transition spd="med" p14:dur="700">
+        <p:fade/>
+      </p:transition>
+    </mc:Choice>
+    <mc:Fallback>
+      <p:transition spd="med">
+        <p:fade/>
+      </p:transition>
+    </mc:Fallback>
+  </mc:AlternateContent>
   <p:timing>
     <p:tnLst>
       <p:par>
@@ -6750,54 +6928,341 @@
           <a:chExt cx="0" cy="0"/>
         </a:xfrm>
       </p:grpSpPr>
-      <p:sp>
-        <p:nvSpPr>
-          <p:cNvPr id="2" name="Título 1"/>
-          <p:cNvSpPr>
-            <a:spLocks noGrp="1"/>
-          </p:cNvSpPr>
-          <p:nvPr>
-            <p:ph type="title"/>
-          </p:nvPr>
-        </p:nvSpPr>
-        <p:spPr/>
-        <p:txBody>
-          <a:bodyPr/>
-          <a:lstStyle/>
-          <a:p>
-            <a:endParaRPr lang="es-ES"/>
-          </a:p>
-        </p:txBody>
-      </p:sp>
-      <p:sp>
-        <p:nvSpPr>
-          <p:cNvPr id="3" name="Marcador de contenido 2"/>
-          <p:cNvSpPr>
-            <a:spLocks noGrp="1"/>
-          </p:cNvSpPr>
-          <p:nvPr>
-            <p:ph idx="1"/>
-          </p:nvPr>
-        </p:nvSpPr>
-        <p:spPr/>
-        <p:txBody>
-          <a:bodyPr/>
-          <a:lstStyle/>
-          <a:p>
-            <a:endParaRPr lang="es-ES"/>
-          </a:p>
-        </p:txBody>
-      </p:sp>
+      <p:grpSp>
+        <p:nvGrpSpPr>
+          <p:cNvPr id="4" name="3 Grupo"/>
+          <p:cNvGrpSpPr/>
+          <p:nvPr/>
+        </p:nvGrpSpPr>
+        <p:grpSpPr>
+          <a:xfrm>
+            <a:off x="2354039" y="914397"/>
+            <a:ext cx="7585023" cy="5090615"/>
+            <a:chOff x="2098612" y="914400"/>
+            <a:chExt cx="7585023" cy="5090615"/>
+          </a:xfrm>
+        </p:grpSpPr>
+        <p:pic>
+          <p:nvPicPr>
+            <p:cNvPr id="1029" name="Imagen 1028"/>
+            <p:cNvPicPr>
+              <a:picLocks noChangeAspect="1"/>
+            </p:cNvPicPr>
+            <p:nvPr/>
+          </p:nvPicPr>
+          <p:blipFill>
+            <a:blip r:embed="rId2">
+              <a:extLst>
+                <a:ext uri="{28A0092B-C50C-407E-A947-70E740481C1C}">
+                  <a14:useLocalDpi xmlns:a14="http://schemas.microsoft.com/office/drawing/2010/main" val="0"/>
+                </a:ext>
+              </a:extLst>
+            </a:blip>
+            <a:stretch>
+              <a:fillRect/>
+            </a:stretch>
+          </p:blipFill>
+          <p:spPr>
+            <a:xfrm>
+              <a:off x="2412678" y="2741383"/>
+              <a:ext cx="2078356" cy="2078356"/>
+            </a:xfrm>
+            <a:prstGeom prst="rect">
+              <a:avLst/>
+            </a:prstGeom>
+          </p:spPr>
+        </p:pic>
+        <p:sp>
+          <p:nvSpPr>
+            <p:cNvPr id="1036" name="Rectángulo 1035"/>
+            <p:cNvSpPr/>
+            <p:nvPr/>
+          </p:nvSpPr>
+          <p:spPr>
+            <a:xfrm>
+              <a:off x="2098612" y="914400"/>
+              <a:ext cx="7585023" cy="5090615"/>
+            </a:xfrm>
+            <a:prstGeom prst="rect">
+              <a:avLst/>
+            </a:prstGeom>
+            <a:noFill/>
+            <a:ln>
+              <a:solidFill>
+                <a:schemeClr val="tx1"/>
+              </a:solidFill>
+            </a:ln>
+          </p:spPr>
+          <p:style>
+            <a:lnRef idx="2">
+              <a:schemeClr val="accent1">
+                <a:shade val="50000"/>
+              </a:schemeClr>
+            </a:lnRef>
+            <a:fillRef idx="1">
+              <a:schemeClr val="accent1"/>
+            </a:fillRef>
+            <a:effectRef idx="0">
+              <a:schemeClr val="accent1"/>
+            </a:effectRef>
+            <a:fontRef idx="minor">
+              <a:schemeClr val="lt1"/>
+            </a:fontRef>
+          </p:style>
+          <p:txBody>
+            <a:bodyPr rtlCol="0" anchor="ctr"/>
+            <a:lstStyle/>
+            <a:p>
+              <a:pPr algn="ctr"/>
+              <a:endParaRPr lang="es-ES"/>
+            </a:p>
+          </p:txBody>
+        </p:sp>
+        <p:sp>
+          <p:nvSpPr>
+            <p:cNvPr id="1037" name="CuadroTexto 1036"/>
+            <p:cNvSpPr txBox="1"/>
+            <p:nvPr/>
+          </p:nvSpPr>
+          <p:spPr>
+            <a:xfrm>
+              <a:off x="5121912" y="3965227"/>
+              <a:ext cx="2723823" cy="369332"/>
+            </a:xfrm>
+            <a:prstGeom prst="rect">
+              <a:avLst/>
+            </a:prstGeom>
+            <a:noFill/>
+          </p:spPr>
+          <p:txBody>
+            <a:bodyPr wrap="none" rtlCol="0">
+              <a:spAutoFit/>
+            </a:bodyPr>
+            <a:lstStyle/>
+            <a:p>
+              <a:r>
+                <a:rPr lang="es-ES" dirty="0" smtClean="0">
+                  <a:latin typeface="Century Gothic" panose="020B0502020202020204" pitchFamily="34" charset="0"/>
+                </a:rPr>
+                <a:t>Escanee su credencial</a:t>
+              </a:r>
+              <a:endParaRPr lang="es-ES" dirty="0">
+                <a:latin typeface="Century Gothic" panose="020B0502020202020204" pitchFamily="34" charset="0"/>
+              </a:endParaRPr>
+            </a:p>
+          </p:txBody>
+        </p:sp>
+        <p:sp>
+          <p:nvSpPr>
+            <p:cNvPr id="56" name="CuadroTexto 55"/>
+            <p:cNvSpPr txBox="1"/>
+            <p:nvPr/>
+          </p:nvSpPr>
+          <p:spPr>
+            <a:xfrm>
+              <a:off x="4296161" y="2626415"/>
+              <a:ext cx="2610010" cy="369332"/>
+            </a:xfrm>
+            <a:prstGeom prst="rect">
+              <a:avLst/>
+            </a:prstGeom>
+            <a:noFill/>
+          </p:spPr>
+          <p:txBody>
+            <a:bodyPr wrap="none" rtlCol="0">
+              <a:spAutoFit/>
+            </a:bodyPr>
+            <a:lstStyle/>
+            <a:p>
+              <a:r>
+                <a:rPr lang="es-ES" dirty="0" smtClean="0">
+                  <a:latin typeface="Century Gothic" panose="020B0502020202020204" pitchFamily="34" charset="0"/>
+                </a:rPr>
+                <a:t>Ingrese la contraseña</a:t>
+              </a:r>
+              <a:endParaRPr lang="es-ES" dirty="0">
+                <a:latin typeface="Century Gothic" panose="020B0502020202020204" pitchFamily="34" charset="0"/>
+              </a:endParaRPr>
+            </a:p>
+          </p:txBody>
+        </p:sp>
+        <p:sp>
+          <p:nvSpPr>
+            <p:cNvPr id="2" name="1 CuadroTexto"/>
+            <p:cNvSpPr txBox="1"/>
+            <p:nvPr/>
+          </p:nvSpPr>
+          <p:spPr>
+            <a:xfrm>
+              <a:off x="2555447" y="1357439"/>
+              <a:ext cx="6671352" cy="954107"/>
+            </a:xfrm>
+            <a:prstGeom prst="rect">
+              <a:avLst/>
+            </a:prstGeom>
+            <a:noFill/>
+          </p:spPr>
+          <p:txBody>
+            <a:bodyPr wrap="square" rtlCol="0">
+              <a:spAutoFit/>
+            </a:bodyPr>
+            <a:lstStyle/>
+            <a:p>
+              <a:pPr algn="ctr"/>
+              <a:r>
+                <a:rPr lang="es-AR" sz="2800" dirty="0" smtClean="0">
+                  <a:latin typeface="Century Gothic" pitchFamily="34" charset="0"/>
+                </a:rPr>
+                <a:t>Esta acción requiere permisos de administrador</a:t>
+              </a:r>
+              <a:endParaRPr lang="es-AR" sz="2800" dirty="0">
+                <a:latin typeface="Century Gothic" pitchFamily="34" charset="0"/>
+              </a:endParaRPr>
+            </a:p>
+          </p:txBody>
+        </p:sp>
+        <p:sp>
+          <p:nvSpPr>
+            <p:cNvPr id="25" name="Rectángulo redondeado 4"/>
+            <p:cNvSpPr/>
+            <p:nvPr/>
+          </p:nvSpPr>
+          <p:spPr>
+            <a:xfrm>
+              <a:off x="4296161" y="3009168"/>
+              <a:ext cx="4211049" cy="450537"/>
+            </a:xfrm>
+            <a:prstGeom prst="roundRect">
+              <a:avLst/>
+            </a:prstGeom>
+            <a:solidFill>
+              <a:schemeClr val="tx1">
+                <a:alpha val="22000"/>
+              </a:schemeClr>
+            </a:solidFill>
+            <a:ln>
+              <a:noFill/>
+            </a:ln>
+          </p:spPr>
+          <p:style>
+            <a:lnRef idx="2">
+              <a:schemeClr val="accent1">
+                <a:shade val="50000"/>
+              </a:schemeClr>
+            </a:lnRef>
+            <a:fillRef idx="1">
+              <a:schemeClr val="accent1"/>
+            </a:fillRef>
+            <a:effectRef idx="0">
+              <a:schemeClr val="accent1"/>
+            </a:effectRef>
+            <a:fontRef idx="minor">
+              <a:schemeClr val="lt1"/>
+            </a:fontRef>
+          </p:style>
+          <p:txBody>
+            <a:bodyPr rtlCol="0" anchor="ctr"/>
+            <a:lstStyle/>
+            <a:p>
+              <a:pPr algn="r"/>
+              <a:endParaRPr lang="es-ES" dirty="0"/>
+            </a:p>
+          </p:txBody>
+        </p:sp>
+        <p:sp>
+          <p:nvSpPr>
+            <p:cNvPr id="3" name="2 CuadroTexto"/>
+            <p:cNvSpPr txBox="1"/>
+            <p:nvPr/>
+          </p:nvSpPr>
+          <p:spPr>
+            <a:xfrm>
+              <a:off x="6308098" y="3595895"/>
+              <a:ext cx="306494" cy="369332"/>
+            </a:xfrm>
+            <a:prstGeom prst="rect">
+              <a:avLst/>
+            </a:prstGeom>
+            <a:noFill/>
+          </p:spPr>
+          <p:txBody>
+            <a:bodyPr wrap="none" rtlCol="0">
+              <a:spAutoFit/>
+            </a:bodyPr>
+            <a:lstStyle/>
+            <a:p>
+              <a:r>
+                <a:rPr lang="es-AR" dirty="0" smtClean="0"/>
+                <a:t>o</a:t>
+              </a:r>
+              <a:endParaRPr lang="es-AR" dirty="0"/>
+            </a:p>
+          </p:txBody>
+        </p:sp>
+        <p:pic>
+          <p:nvPicPr>
+            <p:cNvPr id="27" name="Picture 2" descr="Resultado de imagen para Codigo de barras png"/>
+            <p:cNvPicPr>
+              <a:picLocks noChangeAspect="1" noChangeArrowheads="1"/>
+            </p:cNvPicPr>
+            <p:nvPr/>
+          </p:nvPicPr>
+          <p:blipFill>
+            <a:blip r:embed="rId3" cstate="print">
+              <a:extLst>
+                <a:ext uri="{28A0092B-C50C-407E-A947-70E740481C1C}">
+                  <a14:useLocalDpi xmlns:a14="http://schemas.microsoft.com/office/drawing/2010/main" val="0"/>
+                </a:ext>
+              </a:extLst>
+            </a:blip>
+            <a:srcRect/>
+            <a:stretch>
+              <a:fillRect/>
+            </a:stretch>
+          </p:blipFill>
+          <p:spPr bwMode="auto">
+            <a:xfrm>
+              <a:off x="5048314" y="4334559"/>
+              <a:ext cx="2871017" cy="1377144"/>
+            </a:xfrm>
+            <a:prstGeom prst="rect">
+              <a:avLst/>
+            </a:prstGeom>
+            <a:noFill/>
+            <a:extLst>
+              <a:ext uri="{909E8E84-426E-40DD-AFC4-6F175D3DCCD1}">
+                <a14:hiddenFill xmlns:a14="http://schemas.microsoft.com/office/drawing/2010/main">
+                  <a:solidFill>
+                    <a:srgbClr val="FFFFFF"/>
+                  </a:solidFill>
+                </a14:hiddenFill>
+              </a:ext>
+            </a:extLst>
+          </p:spPr>
+        </p:pic>
+      </p:grpSp>
     </p:spTree>
     <p:extLst>
       <p:ext uri="{BB962C8B-B14F-4D97-AF65-F5344CB8AC3E}">
-        <p14:creationId xmlns:p14="http://schemas.microsoft.com/office/powerpoint/2010/main" val="1850193752"/>
+        <p14:creationId xmlns:p14="http://schemas.microsoft.com/office/powerpoint/2010/main" val="3877697448"/>
       </p:ext>
     </p:extLst>
   </p:cSld>
   <p:clrMapOvr>
     <a:masterClrMapping/>
   </p:clrMapOvr>
+  <mc:AlternateContent xmlns:mc="http://schemas.openxmlformats.org/markup-compatibility/2006">
+    <mc:Choice xmlns:p14="http://schemas.microsoft.com/office/powerpoint/2010/main" Requires="p14">
+      <p:transition spd="med" p14:dur="700">
+        <p:fade/>
+      </p:transition>
+    </mc:Choice>
+    <mc:Fallback>
+      <p:transition spd="med">
+        <p:fade/>
+      </p:transition>
+    </mc:Fallback>
+  </mc:AlternateContent>
   <p:timing>
     <p:tnLst>
       <p:par>
@@ -6825,44 +7290,284 @@
           <a:chExt cx="0" cy="0"/>
         </a:xfrm>
       </p:grpSpPr>
-      <p:sp>
-        <p:nvSpPr>
-          <p:cNvPr id="2" name="Título 1"/>
-          <p:cNvSpPr>
-            <a:spLocks noGrp="1"/>
-          </p:cNvSpPr>
-          <p:nvPr>
-            <p:ph type="title"/>
-          </p:nvPr>
-        </p:nvSpPr>
-        <p:spPr/>
-        <p:txBody>
-          <a:bodyPr/>
-          <a:lstStyle/>
-          <a:p>
-            <a:endParaRPr lang="es-ES"/>
-          </a:p>
-        </p:txBody>
-      </p:sp>
-      <p:sp>
-        <p:nvSpPr>
-          <p:cNvPr id="3" name="Marcador de contenido 2"/>
-          <p:cNvSpPr>
-            <a:spLocks noGrp="1"/>
-          </p:cNvSpPr>
-          <p:nvPr>
-            <p:ph idx="1"/>
-          </p:nvPr>
-        </p:nvSpPr>
-        <p:spPr/>
-        <p:txBody>
-          <a:bodyPr/>
-          <a:lstStyle/>
-          <a:p>
-            <a:endParaRPr lang="es-ES"/>
-          </a:p>
-        </p:txBody>
-      </p:sp>
+      <p:grpSp>
+        <p:nvGrpSpPr>
+          <p:cNvPr id="16" name="15 Grupo"/>
+          <p:cNvGrpSpPr/>
+          <p:nvPr/>
+        </p:nvGrpSpPr>
+        <p:grpSpPr>
+          <a:xfrm>
+            <a:off x="2555446" y="984256"/>
+            <a:ext cx="7128187" cy="4302177"/>
+            <a:chOff x="2327029" y="914400"/>
+            <a:chExt cx="7128187" cy="4302177"/>
+          </a:xfrm>
+        </p:grpSpPr>
+        <p:pic>
+          <p:nvPicPr>
+            <p:cNvPr id="4" name="Imagen 1028"/>
+            <p:cNvPicPr>
+              <a:picLocks noChangeAspect="1"/>
+            </p:cNvPicPr>
+            <p:nvPr/>
+          </p:nvPicPr>
+          <p:blipFill>
+            <a:blip r:embed="rId2">
+              <a:extLst>
+                <a:ext uri="{28A0092B-C50C-407E-A947-70E740481C1C}">
+                  <a14:useLocalDpi xmlns:a14="http://schemas.microsoft.com/office/drawing/2010/main" val="0"/>
+                </a:ext>
+              </a:extLst>
+            </a:blip>
+            <a:stretch>
+              <a:fillRect/>
+            </a:stretch>
+          </p:blipFill>
+          <p:spPr>
+            <a:xfrm>
+              <a:off x="2641095" y="2741383"/>
+              <a:ext cx="2078356" cy="2078356"/>
+            </a:xfrm>
+            <a:prstGeom prst="rect">
+              <a:avLst/>
+            </a:prstGeom>
+          </p:spPr>
+        </p:pic>
+        <p:sp>
+          <p:nvSpPr>
+            <p:cNvPr id="5" name="Rectángulo 1035"/>
+            <p:cNvSpPr/>
+            <p:nvPr/>
+          </p:nvSpPr>
+          <p:spPr>
+            <a:xfrm>
+              <a:off x="2327029" y="914400"/>
+              <a:ext cx="7128187" cy="4302177"/>
+            </a:xfrm>
+            <a:prstGeom prst="rect">
+              <a:avLst/>
+            </a:prstGeom>
+            <a:noFill/>
+            <a:ln>
+              <a:solidFill>
+                <a:schemeClr val="tx1"/>
+              </a:solidFill>
+            </a:ln>
+          </p:spPr>
+          <p:style>
+            <a:lnRef idx="2">
+              <a:schemeClr val="accent1">
+                <a:shade val="50000"/>
+              </a:schemeClr>
+            </a:lnRef>
+            <a:fillRef idx="1">
+              <a:schemeClr val="accent1"/>
+            </a:fillRef>
+            <a:effectRef idx="0">
+              <a:schemeClr val="accent1"/>
+            </a:effectRef>
+            <a:fontRef idx="minor">
+              <a:schemeClr val="lt1"/>
+            </a:fontRef>
+          </p:style>
+          <p:txBody>
+            <a:bodyPr rtlCol="0" anchor="ctr"/>
+            <a:lstStyle/>
+            <a:p>
+              <a:pPr algn="ctr"/>
+              <a:endParaRPr lang="es-ES"/>
+            </a:p>
+          </p:txBody>
+        </p:sp>
+        <p:sp>
+          <p:nvSpPr>
+            <p:cNvPr id="8" name="7 CuadroTexto"/>
+            <p:cNvSpPr txBox="1"/>
+            <p:nvPr/>
+          </p:nvSpPr>
+          <p:spPr>
+            <a:xfrm>
+              <a:off x="2783864" y="1357439"/>
+              <a:ext cx="6671352" cy="954107"/>
+            </a:xfrm>
+            <a:prstGeom prst="rect">
+              <a:avLst/>
+            </a:prstGeom>
+            <a:noFill/>
+          </p:spPr>
+          <p:txBody>
+            <a:bodyPr wrap="square" rtlCol="0">
+              <a:spAutoFit/>
+            </a:bodyPr>
+            <a:lstStyle/>
+            <a:p>
+              <a:pPr algn="ctr"/>
+              <a:r>
+                <a:rPr lang="es-AR" sz="2800" dirty="0" smtClean="0">
+                  <a:latin typeface="Century Gothic" pitchFamily="34" charset="0"/>
+                </a:rPr>
+                <a:t>Usted está accediendo al área de eliminación de empleados</a:t>
+              </a:r>
+              <a:endParaRPr lang="es-AR" sz="2800" dirty="0">
+                <a:latin typeface="Century Gothic" pitchFamily="34" charset="0"/>
+              </a:endParaRPr>
+            </a:p>
+          </p:txBody>
+        </p:sp>
+        <p:sp>
+          <p:nvSpPr>
+            <p:cNvPr id="12" name="CuadroTexto 16"/>
+            <p:cNvSpPr txBox="1"/>
+            <p:nvPr/>
+          </p:nvSpPr>
+          <p:spPr>
+            <a:xfrm>
+              <a:off x="6499764" y="3090375"/>
+              <a:ext cx="916598" cy="369332"/>
+            </a:xfrm>
+            <a:prstGeom prst="rect">
+              <a:avLst/>
+            </a:prstGeom>
+            <a:noFill/>
+          </p:spPr>
+          <p:txBody>
+            <a:bodyPr wrap="none" rtlCol="0">
+              <a:spAutoFit/>
+            </a:bodyPr>
+            <a:lstStyle/>
+            <a:p>
+              <a:r>
+                <a:rPr lang="es-ES" dirty="0" smtClean="0"/>
+                <a:t>Aceptar</a:t>
+              </a:r>
+              <a:endParaRPr lang="es-ES" dirty="0"/>
+            </a:p>
+          </p:txBody>
+        </p:sp>
+        <p:sp>
+          <p:nvSpPr>
+            <p:cNvPr id="13" name="Rectángulo redondeado 17"/>
+            <p:cNvSpPr/>
+            <p:nvPr/>
+          </p:nvSpPr>
+          <p:spPr>
+            <a:xfrm>
+              <a:off x="5313885" y="3062194"/>
+              <a:ext cx="3176789" cy="425694"/>
+            </a:xfrm>
+            <a:prstGeom prst="roundRect">
+              <a:avLst/>
+            </a:prstGeom>
+            <a:noFill/>
+            <a:ln>
+              <a:solidFill>
+                <a:schemeClr val="tx1"/>
+              </a:solidFill>
+            </a:ln>
+          </p:spPr>
+          <p:style>
+            <a:lnRef idx="2">
+              <a:schemeClr val="accent1">
+                <a:shade val="50000"/>
+              </a:schemeClr>
+            </a:lnRef>
+            <a:fillRef idx="1">
+              <a:schemeClr val="accent1"/>
+            </a:fillRef>
+            <a:effectRef idx="0">
+              <a:schemeClr val="accent1"/>
+            </a:effectRef>
+            <a:fontRef idx="minor">
+              <a:schemeClr val="lt1"/>
+            </a:fontRef>
+          </p:style>
+          <p:txBody>
+            <a:bodyPr rtlCol="0" anchor="ctr"/>
+            <a:lstStyle/>
+            <a:p>
+              <a:pPr algn="r"/>
+              <a:endParaRPr lang="es-ES" dirty="0"/>
+            </a:p>
+          </p:txBody>
+        </p:sp>
+        <p:sp>
+          <p:nvSpPr>
+            <p:cNvPr id="14" name="CuadroTexto 16"/>
+            <p:cNvSpPr txBox="1"/>
+            <p:nvPr/>
+          </p:nvSpPr>
+          <p:spPr>
+            <a:xfrm>
+              <a:off x="6499763" y="3836923"/>
+              <a:ext cx="997389" cy="369332"/>
+            </a:xfrm>
+            <a:prstGeom prst="rect">
+              <a:avLst/>
+            </a:prstGeom>
+            <a:noFill/>
+          </p:spPr>
+          <p:txBody>
+            <a:bodyPr wrap="none" rtlCol="0">
+              <a:spAutoFit/>
+            </a:bodyPr>
+            <a:lstStyle/>
+            <a:p>
+              <a:r>
+                <a:rPr lang="es-ES" dirty="0" smtClean="0"/>
+                <a:t>Cancelar</a:t>
+              </a:r>
+              <a:endParaRPr lang="es-ES" dirty="0"/>
+            </a:p>
+          </p:txBody>
+        </p:sp>
+        <p:sp>
+          <p:nvSpPr>
+            <p:cNvPr id="15" name="Rectángulo redondeado 17"/>
+            <p:cNvSpPr/>
+            <p:nvPr/>
+          </p:nvSpPr>
+          <p:spPr>
+            <a:xfrm>
+              <a:off x="5313884" y="3808742"/>
+              <a:ext cx="3176789" cy="425694"/>
+            </a:xfrm>
+            <a:prstGeom prst="roundRect">
+              <a:avLst/>
+            </a:prstGeom>
+            <a:noFill/>
+            <a:ln>
+              <a:solidFill>
+                <a:schemeClr val="tx1"/>
+              </a:solidFill>
+            </a:ln>
+          </p:spPr>
+          <p:style>
+            <a:lnRef idx="2">
+              <a:schemeClr val="accent1">
+                <a:shade val="50000"/>
+              </a:schemeClr>
+            </a:lnRef>
+            <a:fillRef idx="1">
+              <a:schemeClr val="accent1"/>
+            </a:fillRef>
+            <a:effectRef idx="0">
+              <a:schemeClr val="accent1"/>
+            </a:effectRef>
+            <a:fontRef idx="minor">
+              <a:schemeClr val="lt1"/>
+            </a:fontRef>
+          </p:style>
+          <p:txBody>
+            <a:bodyPr rtlCol="0" anchor="ctr"/>
+            <a:lstStyle/>
+            <a:p>
+              <a:pPr algn="r"/>
+              <a:endParaRPr lang="es-ES" dirty="0"/>
+            </a:p>
+          </p:txBody>
+        </p:sp>
+      </p:grpSp>
     </p:spTree>
     <p:extLst>
       <p:ext uri="{BB962C8B-B14F-4D97-AF65-F5344CB8AC3E}">
@@ -6873,6 +7578,18 @@
   <p:clrMapOvr>
     <a:masterClrMapping/>
   </p:clrMapOvr>
+  <mc:AlternateContent xmlns:mc="http://schemas.openxmlformats.org/markup-compatibility/2006">
+    <mc:Choice xmlns:p14="http://schemas.microsoft.com/office/powerpoint/2010/main" Requires="p14">
+      <p:transition spd="med" p14:dur="700">
+        <p:fade/>
+      </p:transition>
+    </mc:Choice>
+    <mc:Fallback>
+      <p:transition spd="med">
+        <p:fade/>
+      </p:transition>
+    </mc:Fallback>
+  </mc:AlternateContent>
   <p:timing>
     <p:tnLst>
       <p:par>
@@ -6948,6 +7665,18 @@
   <p:clrMapOvr>
     <a:masterClrMapping/>
   </p:clrMapOvr>
+  <mc:AlternateContent xmlns:mc="http://schemas.openxmlformats.org/markup-compatibility/2006">
+    <mc:Choice xmlns:p14="http://schemas.microsoft.com/office/powerpoint/2010/main" Requires="p14">
+      <p:transition spd="med" p14:dur="700">
+        <p:fade/>
+      </p:transition>
+    </mc:Choice>
+    <mc:Fallback>
+      <p:transition spd="med">
+        <p:fade/>
+      </p:transition>
+    </mc:Fallback>
+  </mc:AlternateContent>
 </p:sld>
 </file>
 
@@ -7016,6 +7745,18 @@
   <p:clrMapOvr>
     <a:masterClrMapping/>
   </p:clrMapOvr>
+  <mc:AlternateContent xmlns:mc="http://schemas.openxmlformats.org/markup-compatibility/2006">
+    <mc:Choice xmlns:p14="http://schemas.microsoft.com/office/powerpoint/2010/main" Requires="p14">
+      <p:transition spd="med" p14:dur="700">
+        <p:fade/>
+      </p:transition>
+    </mc:Choice>
+    <mc:Fallback>
+      <p:transition spd="med">
+        <p:fade/>
+      </p:transition>
+    </mc:Fallback>
+  </mc:AlternateContent>
 </p:sld>
 </file>
 
@@ -7084,6 +7825,18 @@
   <p:clrMapOvr>
     <a:masterClrMapping/>
   </p:clrMapOvr>
+  <mc:AlternateContent xmlns:mc="http://schemas.openxmlformats.org/markup-compatibility/2006">
+    <mc:Choice xmlns:p14="http://schemas.microsoft.com/office/powerpoint/2010/main" Requires="p14">
+      <p:transition spd="med" p14:dur="700">
+        <p:fade/>
+      </p:transition>
+    </mc:Choice>
+    <mc:Fallback>
+      <p:transition spd="med">
+        <p:fade/>
+      </p:transition>
+    </mc:Fallback>
+  </mc:AlternateContent>
 </p:sld>
 </file>
 
@@ -7130,7 +7883,7 @@
     </a:clrScheme>
     <a:fontScheme name="Office">
       <a:majorFont>
-        <a:latin typeface="Calibri Light" panose="020F0302020204030204"/>
+        <a:latin typeface="Calibri Light"/>
         <a:ea typeface=""/>
         <a:cs typeface=""/>
         <a:font script="Jpan" typeface="ＭＳ Ｐゴシック"/>
@@ -7165,7 +7918,7 @@
         <a:font script="Geor" typeface="Sylfaen"/>
       </a:majorFont>
       <a:minorFont>
-        <a:latin typeface="Calibri" panose="020F0502020204030204"/>
+        <a:latin typeface="Calibri"/>
         <a:ea typeface=""/>
         <a:cs typeface=""/>
         <a:font script="Jpan" typeface="ＭＳ Ｐゴシック"/>
@@ -7342,7 +8095,7 @@
   <a:extraClrSchemeLst/>
   <a:extLst>
     <a:ext uri="{05A4C25C-085E-4340-85A3-A5531E510DB2}">
-      <thm15:themeFamily xmlns:thm15="http://schemas.microsoft.com/office/thememl/2012/main" name="Office Theme" id="{62F939B6-93AF-4DB8-9C6B-D6C7DFDC589F}" vid="{4A3C46E8-61CC-4603-A589-7422A47A8E4A}"/>
+      <thm15:themeFamily xmlns:thm15="http://schemas.microsoft.com/office/thememl/2012/main" xmlns="" name="Office Theme" id="{62F939B6-93AF-4DB8-9C6B-D6C7DFDC589F}" vid="{4A3C46E8-61CC-4603-A589-7422A47A8E4A}"/>
     </a:ext>
   </a:extLst>
 </a:theme>

</xml_diff>